<commit_message>
Hibernate-search - refactoring and deep association example
</commit_message>
<xml_diff>
--- a/spring-hibernate-lucene/Prezentacja.pptx
+++ b/spring-hibernate-lucene/Prezentacja.pptx
@@ -9,10 +9,11 @@
     <p:sldId id="257" r:id="rId3"/>
     <p:sldId id="258" r:id="rId4"/>
     <p:sldId id="259" r:id="rId5"/>
-    <p:sldId id="260" r:id="rId6"/>
-    <p:sldId id="263" r:id="rId7"/>
-    <p:sldId id="262" r:id="rId8"/>
-    <p:sldId id="261" r:id="rId9"/>
+    <p:sldId id="264" r:id="rId6"/>
+    <p:sldId id="260" r:id="rId7"/>
+    <p:sldId id="263" r:id="rId8"/>
+    <p:sldId id="262" r:id="rId9"/>
+    <p:sldId id="261" r:id="rId10"/>
   </p:sldIdLst>
   <p:sldSz cx="12192000" cy="6858000"/>
   <p:notesSz cx="6858000" cy="9144000"/>
@@ -111,6 +112,11 @@
       </a:defRPr>
     </a:lvl9pPr>
   </p:defaultTextStyle>
+  <p:extLst>
+    <p:ext uri="{EFAFB233-063F-42B5-8137-9DF3F51BA10A}">
+      <p15:sldGuideLst xmlns:p15="http://schemas.microsoft.com/office/powerpoint/2012/main"/>
+    </p:ext>
+  </p:extLst>
 </p:presentation>
 </file>
 
@@ -245,7 +251,7 @@
           <a:p>
             <a:fld id="{778B7E12-239D-4478-98C4-8AE62C392539}" type="datetimeFigureOut">
               <a:rPr lang="pl-PL" smtClean="0"/>
-              <a:t>15.12.2015</a:t>
+              <a:t>05.01.2016</a:t>
             </a:fld>
             <a:endParaRPr lang="pl-PL"/>
           </a:p>
@@ -415,7 +421,7 @@
           <a:p>
             <a:fld id="{778B7E12-239D-4478-98C4-8AE62C392539}" type="datetimeFigureOut">
               <a:rPr lang="pl-PL" smtClean="0"/>
-              <a:t>15.12.2015</a:t>
+              <a:t>05.01.2016</a:t>
             </a:fld>
             <a:endParaRPr lang="pl-PL"/>
           </a:p>
@@ -595,7 +601,7 @@
           <a:p>
             <a:fld id="{778B7E12-239D-4478-98C4-8AE62C392539}" type="datetimeFigureOut">
               <a:rPr lang="pl-PL" smtClean="0"/>
-              <a:t>15.12.2015</a:t>
+              <a:t>05.01.2016</a:t>
             </a:fld>
             <a:endParaRPr lang="pl-PL"/>
           </a:p>
@@ -765,7 +771,7 @@
           <a:p>
             <a:fld id="{778B7E12-239D-4478-98C4-8AE62C392539}" type="datetimeFigureOut">
               <a:rPr lang="pl-PL" smtClean="0"/>
-              <a:t>15.12.2015</a:t>
+              <a:t>05.01.2016</a:t>
             </a:fld>
             <a:endParaRPr lang="pl-PL"/>
           </a:p>
@@ -1011,7 +1017,7 @@
           <a:p>
             <a:fld id="{778B7E12-239D-4478-98C4-8AE62C392539}" type="datetimeFigureOut">
               <a:rPr lang="pl-PL" smtClean="0"/>
-              <a:t>15.12.2015</a:t>
+              <a:t>05.01.2016</a:t>
             </a:fld>
             <a:endParaRPr lang="pl-PL"/>
           </a:p>
@@ -1243,7 +1249,7 @@
           <a:p>
             <a:fld id="{778B7E12-239D-4478-98C4-8AE62C392539}" type="datetimeFigureOut">
               <a:rPr lang="pl-PL" smtClean="0"/>
-              <a:t>15.12.2015</a:t>
+              <a:t>05.01.2016</a:t>
             </a:fld>
             <a:endParaRPr lang="pl-PL"/>
           </a:p>
@@ -1610,7 +1616,7 @@
           <a:p>
             <a:fld id="{778B7E12-239D-4478-98C4-8AE62C392539}" type="datetimeFigureOut">
               <a:rPr lang="pl-PL" smtClean="0"/>
-              <a:t>15.12.2015</a:t>
+              <a:t>05.01.2016</a:t>
             </a:fld>
             <a:endParaRPr lang="pl-PL"/>
           </a:p>
@@ -1728,7 +1734,7 @@
           <a:p>
             <a:fld id="{778B7E12-239D-4478-98C4-8AE62C392539}" type="datetimeFigureOut">
               <a:rPr lang="pl-PL" smtClean="0"/>
-              <a:t>15.12.2015</a:t>
+              <a:t>05.01.2016</a:t>
             </a:fld>
             <a:endParaRPr lang="pl-PL"/>
           </a:p>
@@ -1823,7 +1829,7 @@
           <a:p>
             <a:fld id="{778B7E12-239D-4478-98C4-8AE62C392539}" type="datetimeFigureOut">
               <a:rPr lang="pl-PL" smtClean="0"/>
-              <a:t>15.12.2015</a:t>
+              <a:t>05.01.2016</a:t>
             </a:fld>
             <a:endParaRPr lang="pl-PL"/>
           </a:p>
@@ -2100,7 +2106,7 @@
           <a:p>
             <a:fld id="{778B7E12-239D-4478-98C4-8AE62C392539}" type="datetimeFigureOut">
               <a:rPr lang="pl-PL" smtClean="0"/>
-              <a:t>15.12.2015</a:t>
+              <a:t>05.01.2016</a:t>
             </a:fld>
             <a:endParaRPr lang="pl-PL"/>
           </a:p>
@@ -2353,7 +2359,7 @@
           <a:p>
             <a:fld id="{778B7E12-239D-4478-98C4-8AE62C392539}" type="datetimeFigureOut">
               <a:rPr lang="pl-PL" smtClean="0"/>
-              <a:t>15.12.2015</a:t>
+              <a:t>05.01.2016</a:t>
             </a:fld>
             <a:endParaRPr lang="pl-PL"/>
           </a:p>
@@ -2573,7 +2579,7 @@
           <a:p>
             <a:fld id="{778B7E12-239D-4478-98C4-8AE62C392539}" type="datetimeFigureOut">
               <a:rPr lang="pl-PL" smtClean="0"/>
-              <a:t>15.12.2015</a:t>
+              <a:t>05.01.2016</a:t>
             </a:fld>
             <a:endParaRPr lang="pl-PL"/>
           </a:p>
@@ -3194,6 +3200,18 @@
                   </a:schemeClr>
                 </a:solidFill>
               </a:rPr>
+              <a:t>Tryb wyszukiwania</a:t>
+            </a:r>
+          </a:p>
+          <a:p>
+            <a:r>
+              <a:rPr lang="pl-PL" sz="3000" dirty="0" smtClean="0">
+                <a:solidFill>
+                  <a:schemeClr val="accent6">
+                    <a:lumMod val="75000"/>
+                  </a:schemeClr>
+                </a:solidFill>
+              </a:rPr>
               <a:t>Konfiguracja – przykład konfiguracji ze Spring </a:t>
             </a:r>
             <a:r>
@@ -3406,7 +3424,27 @@
                   </a:schemeClr>
                 </a:solidFill>
               </a:rPr>
-              <a:t>Mechanizm umożliwiający indeksowanie w tle encji zapisywanych do bazy danych (w momencie zakończenia transakcji)</a:t>
+              <a:t>Mechanizm umożliwiający </a:t>
+            </a:r>
+            <a:r>
+              <a:rPr lang="pl-PL" sz="3000" dirty="0" err="1" smtClean="0">
+                <a:solidFill>
+                  <a:schemeClr val="accent6">
+                    <a:lumMod val="75000"/>
+                  </a:schemeClr>
+                </a:solidFill>
+              </a:rPr>
+              <a:t>pełnotekstowe</a:t>
+            </a:r>
+            <a:r>
+              <a:rPr lang="pl-PL" sz="3000" dirty="0" smtClean="0">
+                <a:solidFill>
+                  <a:schemeClr val="accent6">
+                    <a:lumMod val="75000"/>
+                  </a:schemeClr>
+                </a:solidFill>
+              </a:rPr>
+              <a:t> indeksowanie w tle encji zapisywanych do bazy danych (w momencie zakończenia transakcji)</a:t>
             </a:r>
           </a:p>
           <a:p>
@@ -3467,27 +3505,7 @@
                   </a:schemeClr>
                 </a:solidFill>
               </a:rPr>
-              <a:t> </a:t>
-            </a:r>
-            <a:r>
-              <a:rPr lang="pl-PL" sz="3000" dirty="0" smtClean="0">
-                <a:solidFill>
-                  <a:schemeClr val="accent6">
-                    <a:lumMod val="75000"/>
-                  </a:schemeClr>
-                </a:solidFill>
-              </a:rPr>
-              <a:t>wyszukiwanie </a:t>
-            </a:r>
-            <a:r>
-              <a:rPr lang="pl-PL" sz="3000" dirty="0" smtClean="0">
-                <a:solidFill>
-                  <a:schemeClr val="accent6">
-                    <a:lumMod val="75000"/>
-                  </a:schemeClr>
-                </a:solidFill>
-              </a:rPr>
-              <a:t>encji zapisanych w bazie danych</a:t>
+              <a:t> wyszukiwanie encji zapisanych w bazie danych</a:t>
             </a:r>
           </a:p>
           <a:p>
@@ -3677,7 +3695,7 @@
                   </a:schemeClr>
                 </a:solidFill>
               </a:rPr>
-              <a:t>Konfiguracja</a:t>
+              <a:t>Tryb wyszukiwania</a:t>
             </a:r>
             <a:endParaRPr lang="pl-PL" sz="6000" b="1" dirty="0">
               <a:solidFill>
@@ -3699,26 +3717,13 @@
             <p:ph idx="1"/>
           </p:nvPr>
         </p:nvSpPr>
-        <p:spPr>
-          <a:xfrm>
-            <a:off x="838200" y="1825625"/>
-            <a:ext cx="10942320" cy="4351338"/>
-          </a:xfrm>
-        </p:spPr>
-        <p:txBody>
-          <a:bodyPr/>
-          <a:lstStyle/>
-          <a:p>
-            <a:r>
-              <a:rPr lang="pl-PL" sz="3000" b="1" dirty="0" err="1" smtClean="0">
-                <a:solidFill>
-                  <a:schemeClr val="accent6">
-                    <a:lumMod val="75000"/>
-                  </a:schemeClr>
-                </a:solidFill>
-              </a:rPr>
-              <a:t>directory_provider</a:t>
-            </a:r>
+        <p:spPr/>
+        <p:txBody>
+          <a:bodyPr>
+            <a:normAutofit/>
+          </a:bodyPr>
+          <a:lstStyle/>
+          <a:p>
             <a:r>
               <a:rPr lang="pl-PL" sz="3000" dirty="0" smtClean="0">
                 <a:solidFill>
@@ -3727,18 +3732,10 @@
                   </a:schemeClr>
                 </a:solidFill>
               </a:rPr>
-              <a:t> – określa sposób w jaki mają być przetrzymywane indeksy (</a:t>
-            </a:r>
-            <a:r>
-              <a:rPr lang="pl-PL" sz="3000" dirty="0" err="1" smtClean="0">
-                <a:solidFill>
-                  <a:schemeClr val="accent6">
-                    <a:lumMod val="75000"/>
-                  </a:schemeClr>
-                </a:solidFill>
-              </a:rPr>
-              <a:t>filesystem</a:t>
-            </a:r>
+              <a:t>Z odwołaniem do bazy danych – po znalezieniu obiektu w indeksie następuje odwołanie do bazy danych w celu pobrania encji (tryb domyślny).</a:t>
+            </a:r>
+          </a:p>
+          <a:p>
             <a:r>
               <a:rPr lang="pl-PL" sz="3000" dirty="0" smtClean="0">
                 <a:solidFill>
@@ -3747,82 +3744,8 @@
                   </a:schemeClr>
                 </a:solidFill>
               </a:rPr>
-              <a:t>, ram)</a:t>
-            </a:r>
-          </a:p>
-          <a:p>
-            <a:r>
-              <a:rPr lang="pl-PL" sz="3000" b="1" dirty="0" err="1" smtClean="0">
-                <a:solidFill>
-                  <a:schemeClr val="accent6">
-                    <a:lumMod val="75000"/>
-                  </a:schemeClr>
-                </a:solidFill>
-              </a:rPr>
-              <a:t>indexBase</a:t>
-            </a:r>
-            <a:r>
-              <a:rPr lang="pl-PL" sz="3000" dirty="0" smtClean="0">
-                <a:solidFill>
-                  <a:schemeClr val="accent6">
-                    <a:lumMod val="75000"/>
-                  </a:schemeClr>
-                </a:solidFill>
-              </a:rPr>
-              <a:t> – wskazuje na </a:t>
-            </a:r>
-            <a:r>
-              <a:rPr lang="pl-PL" sz="3000" dirty="0" err="1" smtClean="0">
-                <a:solidFill>
-                  <a:schemeClr val="accent6">
-                    <a:lumMod val="75000"/>
-                  </a:schemeClr>
-                </a:solidFill>
-              </a:rPr>
-              <a:t>scieżke</a:t>
-            </a:r>
-            <a:r>
-              <a:rPr lang="pl-PL" sz="3000" dirty="0" smtClean="0">
-                <a:solidFill>
-                  <a:schemeClr val="accent6">
-                    <a:lumMod val="75000"/>
-                  </a:schemeClr>
-                </a:solidFill>
-              </a:rPr>
-              <a:t> przetrzymywania (jeżeli wybrano </a:t>
-            </a:r>
-            <a:r>
-              <a:rPr lang="pl-PL" sz="3000" dirty="0" err="1" smtClean="0">
-                <a:solidFill>
-                  <a:schemeClr val="accent6">
-                    <a:lumMod val="75000"/>
-                  </a:schemeClr>
-                </a:solidFill>
-              </a:rPr>
-              <a:t>directory_provider</a:t>
-            </a:r>
-            <a:r>
-              <a:rPr lang="pl-PL" sz="3000" dirty="0" err="1" smtClean="0">
-                <a:solidFill>
-                  <a:schemeClr val="accent6">
-                    <a:lumMod val="75000"/>
-                  </a:schemeClr>
-                </a:solidFill>
-              </a:rPr>
-              <a:t>:filesystem</a:t>
-            </a:r>
-            <a:r>
-              <a:rPr lang="pl-PL" sz="3000" dirty="0" smtClean="0">
-                <a:solidFill>
-                  <a:schemeClr val="accent6">
-                    <a:lumMod val="75000"/>
-                  </a:schemeClr>
-                </a:solidFill>
-              </a:rPr>
-              <a:t>)</a:t>
-            </a:r>
-          </a:p>
-          <a:p>
+              <a:t>Projekcji – zwracane są jedynie informacje zawarte w indeksach. Brak odwołania do bazy danych.</a:t>
+            </a:r>
             <a:endParaRPr lang="pl-PL" sz="3000" dirty="0">
               <a:solidFill>
                 <a:schemeClr val="accent6">
@@ -3831,62 +3754,12 @@
               </a:solidFill>
             </a:endParaRPr>
           </a:p>
-          <a:p>
-            <a:pPr marL="0" indent="0">
-              <a:buNone/>
-            </a:pPr>
-            <a:r>
-              <a:rPr lang="pl-PL" sz="3000" dirty="0" smtClean="0">
-                <a:solidFill>
-                  <a:schemeClr val="accent6">
-                    <a:lumMod val="75000"/>
-                  </a:schemeClr>
-                </a:solidFill>
-              </a:rPr>
-              <a:t>Więcej na:</a:t>
-            </a:r>
-          </a:p>
-          <a:p>
-            <a:pPr marL="0" indent="0">
-              <a:buNone/>
-            </a:pPr>
-            <a:r>
-              <a:rPr lang="pl-PL" sz="3000" dirty="0" smtClean="0">
-                <a:solidFill>
-                  <a:schemeClr val="accent6">
-                    <a:lumMod val="75000"/>
-                  </a:schemeClr>
-                </a:solidFill>
-                <a:hlinkClick r:id="rId2"/>
-              </a:rPr>
-              <a:t>http://docs.jboss.org/hibernate/stable/search/reference/en-US/html_single/#search-configuration</a:t>
-            </a:r>
-            <a:endParaRPr lang="pl-PL" sz="3000" dirty="0" smtClean="0">
-              <a:solidFill>
-                <a:schemeClr val="accent6">
-                  <a:lumMod val="75000"/>
-                </a:schemeClr>
-              </a:solidFill>
-            </a:endParaRPr>
-          </a:p>
-          <a:p>
-            <a:pPr marL="0" indent="0">
-              <a:buNone/>
-            </a:pPr>
-            <a:endParaRPr lang="pl-PL" sz="3000" dirty="0" smtClean="0">
-              <a:solidFill>
-                <a:schemeClr val="accent6">
-                  <a:lumMod val="75000"/>
-                </a:schemeClr>
-              </a:solidFill>
-            </a:endParaRPr>
-          </a:p>
         </p:txBody>
       </p:sp>
     </p:spTree>
     <p:extLst>
       <p:ext uri="{BB962C8B-B14F-4D97-AF65-F5344CB8AC3E}">
-        <p14:creationId xmlns:p14="http://schemas.microsoft.com/office/powerpoint/2010/main" val="1094230215"/>
+        <p14:creationId xmlns:p14="http://schemas.microsoft.com/office/powerpoint/2010/main" val="2208016668"/>
       </p:ext>
     </p:extLst>
   </p:cSld>
@@ -3925,7 +3798,9 @@
         </p:nvSpPr>
         <p:spPr/>
         <p:txBody>
-          <a:bodyPr/>
+          <a:bodyPr>
+            <a:normAutofit/>
+          </a:bodyPr>
           <a:lstStyle/>
           <a:p>
             <a:r>
@@ -3936,7 +3811,7 @@
                   </a:schemeClr>
                 </a:solidFill>
               </a:rPr>
-              <a:t>Konfiguracja encji</a:t>
+              <a:t>Konfiguracja</a:t>
             </a:r>
             <a:endParaRPr lang="pl-PL" sz="6000" b="1" dirty="0">
               <a:solidFill>
@@ -3958,21 +3833,16 @@
             <p:ph idx="1"/>
           </p:nvPr>
         </p:nvSpPr>
-        <p:spPr/>
-        <p:txBody>
-          <a:bodyPr/>
-          <a:lstStyle/>
-          <a:p>
-            <a:r>
-              <a:rPr lang="pl-PL" sz="3000" b="1" dirty="0" smtClean="0">
-                <a:solidFill>
-                  <a:schemeClr val="accent6">
-                    <a:lumMod val="75000"/>
-                  </a:schemeClr>
-                </a:solidFill>
-              </a:rPr>
-              <a:t>@</a:t>
-            </a:r>
+        <p:spPr>
+          <a:xfrm>
+            <a:off x="838200" y="1825625"/>
+            <a:ext cx="10942320" cy="4351338"/>
+          </a:xfrm>
+        </p:spPr>
+        <p:txBody>
+          <a:bodyPr/>
+          <a:lstStyle/>
+          <a:p>
             <a:r>
               <a:rPr lang="pl-PL" sz="3000" b="1" dirty="0" err="1" smtClean="0">
                 <a:solidFill>
@@ -3981,7 +3851,7 @@
                   </a:schemeClr>
                 </a:solidFill>
               </a:rPr>
-              <a:t>Indexed</a:t>
+              <a:t>directory_provider</a:t>
             </a:r>
             <a:r>
               <a:rPr lang="pl-PL" sz="3000" dirty="0" smtClean="0">
@@ -3991,19 +3861,17 @@
                   </a:schemeClr>
                 </a:solidFill>
               </a:rPr>
-              <a:t> – oznacza encje do zaindeksowania</a:t>
-            </a:r>
-          </a:p>
-          <a:p>
-            <a:r>
-              <a:rPr lang="pl-PL" sz="3000" b="1" dirty="0" smtClean="0">
-                <a:solidFill>
-                  <a:schemeClr val="accent6">
-                    <a:lumMod val="75000"/>
-                  </a:schemeClr>
-                </a:solidFill>
-              </a:rPr>
-              <a:t>@Field</a:t>
+              <a:t> – określa sposób w jaki mają być przetrzymywane indeksy (</a:t>
+            </a:r>
+            <a:r>
+              <a:rPr lang="pl-PL" sz="3000" dirty="0" err="1" smtClean="0">
+                <a:solidFill>
+                  <a:schemeClr val="accent6">
+                    <a:lumMod val="75000"/>
+                  </a:schemeClr>
+                </a:solidFill>
+              </a:rPr>
+              <a:t>filesystem</a:t>
             </a:r>
             <a:r>
               <a:rPr lang="pl-PL" sz="3000" dirty="0" smtClean="0">
@@ -4013,20 +3881,10 @@
                   </a:schemeClr>
                 </a:solidFill>
               </a:rPr>
-              <a:t> – oznacza pole do zaindeksowania</a:t>
-            </a:r>
-          </a:p>
-          <a:p>
-            <a:r>
-              <a:rPr lang="pl-PL" sz="3000" b="1" dirty="0" smtClean="0">
-                <a:solidFill>
-                  <a:schemeClr val="accent6">
-                    <a:lumMod val="75000"/>
-                  </a:schemeClr>
-                </a:solidFill>
-              </a:rPr>
-              <a:t>@</a:t>
-            </a:r>
+              <a:t>, ram)</a:t>
+            </a:r>
+          </a:p>
+          <a:p>
             <a:r>
               <a:rPr lang="pl-PL" sz="3000" b="1" dirty="0" err="1" smtClean="0">
                 <a:solidFill>
@@ -4035,7 +3893,7 @@
                   </a:schemeClr>
                 </a:solidFill>
               </a:rPr>
-              <a:t>DateBridge</a:t>
+              <a:t>indexBase</a:t>
             </a:r>
             <a:r>
               <a:rPr lang="pl-PL" sz="3000" dirty="0" smtClean="0">
@@ -4045,7 +3903,7 @@
                   </a:schemeClr>
                 </a:solidFill>
               </a:rPr>
-              <a:t> – oznacza pole do zaindeksowania typu </a:t>
+              <a:t> – wskazuje na </a:t>
             </a:r>
             <a:r>
               <a:rPr lang="pl-PL" sz="3000" dirty="0" err="1" smtClean="0">
@@ -4055,7 +3913,7 @@
                   </a:schemeClr>
                 </a:solidFill>
               </a:rPr>
-              <a:t>Date</a:t>
+              <a:t>scieżke</a:t>
             </a:r>
             <a:r>
               <a:rPr lang="pl-PL" sz="3000" dirty="0" smtClean="0">
@@ -4065,29 +3923,17 @@
                   </a:schemeClr>
                 </a:solidFill>
               </a:rPr>
-              <a:t> (wartość reprezentowana przez ms od 1970 roku)</a:t>
-            </a:r>
-          </a:p>
-          <a:p>
-            <a:r>
-              <a:rPr lang="pl-PL" sz="3000" b="1" dirty="0" smtClean="0">
-                <a:solidFill>
-                  <a:schemeClr val="accent6">
-                    <a:lumMod val="75000"/>
-                  </a:schemeClr>
-                </a:solidFill>
-              </a:rPr>
-              <a:t>@</a:t>
-            </a:r>
-            <a:r>
-              <a:rPr lang="pl-PL" sz="3000" b="1" dirty="0" err="1" smtClean="0">
-                <a:solidFill>
-                  <a:schemeClr val="accent6">
-                    <a:lumMod val="75000"/>
-                  </a:schemeClr>
-                </a:solidFill>
-              </a:rPr>
-              <a:t>IndexedEmbedded</a:t>
+              <a:t> przetrzymywania (jeżeli wybrano </a:t>
+            </a:r>
+            <a:r>
+              <a:rPr lang="pl-PL" sz="3000" dirty="0" err="1" smtClean="0">
+                <a:solidFill>
+                  <a:schemeClr val="accent6">
+                    <a:lumMod val="75000"/>
+                  </a:schemeClr>
+                </a:solidFill>
+              </a:rPr>
+              <a:t>directory_provider:filesystem</a:t>
             </a:r>
             <a:r>
               <a:rPr lang="pl-PL" sz="3000" dirty="0" smtClean="0">
@@ -4097,30 +3943,22 @@
                   </a:schemeClr>
                 </a:solidFill>
               </a:rPr>
-              <a:t> – wskazuje na asocjacje, która powinna zostać zaindeksowana (płaska struktura)</a:t>
-            </a:r>
-          </a:p>
-          <a:p>
-            <a:r>
-              <a:rPr lang="pl-PL" sz="3000" b="1" dirty="0" smtClean="0">
-                <a:solidFill>
-                  <a:schemeClr val="accent6">
-                    <a:lumMod val="75000"/>
-                  </a:schemeClr>
-                </a:solidFill>
-              </a:rPr>
-              <a:t>@</a:t>
-            </a:r>
-            <a:r>
-              <a:rPr lang="pl-PL" sz="3000" b="1" dirty="0" err="1" smtClean="0">
-                <a:solidFill>
-                  <a:schemeClr val="accent6">
-                    <a:lumMod val="75000"/>
-                  </a:schemeClr>
-                </a:solidFill>
-              </a:rPr>
-              <a:t>TikaBridge</a:t>
-            </a:r>
+              <a:t>)</a:t>
+            </a:r>
+          </a:p>
+          <a:p>
+            <a:endParaRPr lang="pl-PL" sz="3000" dirty="0">
+              <a:solidFill>
+                <a:schemeClr val="accent6">
+                  <a:lumMod val="75000"/>
+                </a:schemeClr>
+              </a:solidFill>
+            </a:endParaRPr>
+          </a:p>
+          <a:p>
+            <a:pPr marL="0" indent="0">
+              <a:buNone/>
+            </a:pPr>
             <a:r>
               <a:rPr lang="pl-PL" sz="3000" dirty="0" smtClean="0">
                 <a:solidFill>
@@ -4129,18 +3967,13 @@
                   </a:schemeClr>
                 </a:solidFill>
               </a:rPr>
-              <a:t> – umożliwia integracje z narzędziami biblioteki Tika (np. wybranie zawartości z pliku tekstowego lub </a:t>
-            </a:r>
-            <a:r>
-              <a:rPr lang="pl-PL" sz="3000" dirty="0" err="1" smtClean="0">
-                <a:solidFill>
-                  <a:schemeClr val="accent6">
-                    <a:lumMod val="75000"/>
-                  </a:schemeClr>
-                </a:solidFill>
-              </a:rPr>
-              <a:t>PDF’a</a:t>
-            </a:r>
+              <a:t>Więcej na:</a:t>
+            </a:r>
+          </a:p>
+          <a:p>
+            <a:pPr marL="0" indent="0">
+              <a:buNone/>
+            </a:pPr>
             <a:r>
               <a:rPr lang="pl-PL" sz="3000" dirty="0" smtClean="0">
                 <a:solidFill>
@@ -4148,19 +3981,36 @@
                     <a:lumMod val="75000"/>
                   </a:schemeClr>
                 </a:solidFill>
-              </a:rPr>
-              <a:t>)</a:t>
-            </a:r>
-          </a:p>
-          <a:p>
-            <a:endParaRPr lang="pl-PL" dirty="0"/>
+                <a:hlinkClick r:id="rId2"/>
+              </a:rPr>
+              <a:t>http://docs.jboss.org/hibernate/stable/search/reference/en-US/html_single/#search-configuration</a:t>
+            </a:r>
+            <a:endParaRPr lang="pl-PL" sz="3000" dirty="0" smtClean="0">
+              <a:solidFill>
+                <a:schemeClr val="accent6">
+                  <a:lumMod val="75000"/>
+                </a:schemeClr>
+              </a:solidFill>
+            </a:endParaRPr>
+          </a:p>
+          <a:p>
+            <a:pPr marL="0" indent="0">
+              <a:buNone/>
+            </a:pPr>
+            <a:endParaRPr lang="pl-PL" sz="3000" dirty="0" smtClean="0">
+              <a:solidFill>
+                <a:schemeClr val="accent6">
+                  <a:lumMod val="75000"/>
+                </a:schemeClr>
+              </a:solidFill>
+            </a:endParaRPr>
           </a:p>
         </p:txBody>
       </p:sp>
     </p:spTree>
     <p:extLst>
       <p:ext uri="{BB962C8B-B14F-4D97-AF65-F5344CB8AC3E}">
-        <p14:creationId xmlns:p14="http://schemas.microsoft.com/office/powerpoint/2010/main" val="694450860"/>
+        <p14:creationId xmlns:p14="http://schemas.microsoft.com/office/powerpoint/2010/main" val="1094230215"/>
       </p:ext>
     </p:extLst>
   </p:cSld>
@@ -4210,6 +4060,290 @@
                   </a:schemeClr>
                 </a:solidFill>
               </a:rPr>
+              <a:t>Konfiguracja encji</a:t>
+            </a:r>
+            <a:endParaRPr lang="pl-PL" sz="6000" b="1" dirty="0">
+              <a:solidFill>
+                <a:schemeClr val="accent6">
+                  <a:lumMod val="75000"/>
+                </a:schemeClr>
+              </a:solidFill>
+            </a:endParaRPr>
+          </a:p>
+        </p:txBody>
+      </p:sp>
+      <p:sp>
+        <p:nvSpPr>
+          <p:cNvPr id="3" name="Symbol zastępczy zawartości 2"/>
+          <p:cNvSpPr>
+            <a:spLocks noGrp="1"/>
+          </p:cNvSpPr>
+          <p:nvPr>
+            <p:ph idx="1"/>
+          </p:nvPr>
+        </p:nvSpPr>
+        <p:spPr/>
+        <p:txBody>
+          <a:bodyPr/>
+          <a:lstStyle/>
+          <a:p>
+            <a:r>
+              <a:rPr lang="pl-PL" sz="3000" b="1" dirty="0" smtClean="0">
+                <a:solidFill>
+                  <a:schemeClr val="accent6">
+                    <a:lumMod val="75000"/>
+                  </a:schemeClr>
+                </a:solidFill>
+              </a:rPr>
+              <a:t>@</a:t>
+            </a:r>
+            <a:r>
+              <a:rPr lang="pl-PL" sz="3000" b="1" dirty="0" err="1" smtClean="0">
+                <a:solidFill>
+                  <a:schemeClr val="accent6">
+                    <a:lumMod val="75000"/>
+                  </a:schemeClr>
+                </a:solidFill>
+              </a:rPr>
+              <a:t>Indexed</a:t>
+            </a:r>
+            <a:r>
+              <a:rPr lang="pl-PL" sz="3000" dirty="0" smtClean="0">
+                <a:solidFill>
+                  <a:schemeClr val="accent6">
+                    <a:lumMod val="75000"/>
+                  </a:schemeClr>
+                </a:solidFill>
+              </a:rPr>
+              <a:t> – oznacza encje do zaindeksowania</a:t>
+            </a:r>
+          </a:p>
+          <a:p>
+            <a:r>
+              <a:rPr lang="pl-PL" sz="3000" b="1" dirty="0" smtClean="0">
+                <a:solidFill>
+                  <a:schemeClr val="accent6">
+                    <a:lumMod val="75000"/>
+                  </a:schemeClr>
+                </a:solidFill>
+              </a:rPr>
+              <a:t>@Field</a:t>
+            </a:r>
+            <a:r>
+              <a:rPr lang="pl-PL" sz="3000" dirty="0" smtClean="0">
+                <a:solidFill>
+                  <a:schemeClr val="accent6">
+                    <a:lumMod val="75000"/>
+                  </a:schemeClr>
+                </a:solidFill>
+              </a:rPr>
+              <a:t> – oznacza pole do zaindeksowania</a:t>
+            </a:r>
+          </a:p>
+          <a:p>
+            <a:r>
+              <a:rPr lang="pl-PL" sz="3000" b="1" dirty="0" smtClean="0">
+                <a:solidFill>
+                  <a:schemeClr val="accent6">
+                    <a:lumMod val="75000"/>
+                  </a:schemeClr>
+                </a:solidFill>
+              </a:rPr>
+              <a:t>@</a:t>
+            </a:r>
+            <a:r>
+              <a:rPr lang="pl-PL" sz="3000" b="1" dirty="0" err="1" smtClean="0">
+                <a:solidFill>
+                  <a:schemeClr val="accent6">
+                    <a:lumMod val="75000"/>
+                  </a:schemeClr>
+                </a:solidFill>
+              </a:rPr>
+              <a:t>DateBridge</a:t>
+            </a:r>
+            <a:r>
+              <a:rPr lang="pl-PL" sz="3000" dirty="0" smtClean="0">
+                <a:solidFill>
+                  <a:schemeClr val="accent6">
+                    <a:lumMod val="75000"/>
+                  </a:schemeClr>
+                </a:solidFill>
+              </a:rPr>
+              <a:t> – oznacza pole do zaindeksowania typu </a:t>
+            </a:r>
+            <a:r>
+              <a:rPr lang="pl-PL" sz="3000" dirty="0" err="1" smtClean="0">
+                <a:solidFill>
+                  <a:schemeClr val="accent6">
+                    <a:lumMod val="75000"/>
+                  </a:schemeClr>
+                </a:solidFill>
+              </a:rPr>
+              <a:t>Date</a:t>
+            </a:r>
+            <a:r>
+              <a:rPr lang="pl-PL" sz="3000" dirty="0" smtClean="0">
+                <a:solidFill>
+                  <a:schemeClr val="accent6">
+                    <a:lumMod val="75000"/>
+                  </a:schemeClr>
+                </a:solidFill>
+              </a:rPr>
+              <a:t> (wartość reprezentowana przez ms od 1970 roku)</a:t>
+            </a:r>
+          </a:p>
+          <a:p>
+            <a:r>
+              <a:rPr lang="pl-PL" sz="3000" b="1" dirty="0" smtClean="0">
+                <a:solidFill>
+                  <a:schemeClr val="accent6">
+                    <a:lumMod val="75000"/>
+                  </a:schemeClr>
+                </a:solidFill>
+              </a:rPr>
+              <a:t>@</a:t>
+            </a:r>
+            <a:r>
+              <a:rPr lang="pl-PL" sz="3000" b="1" dirty="0" err="1" smtClean="0">
+                <a:solidFill>
+                  <a:schemeClr val="accent6">
+                    <a:lumMod val="75000"/>
+                  </a:schemeClr>
+                </a:solidFill>
+              </a:rPr>
+              <a:t>IndexedEmbedded</a:t>
+            </a:r>
+            <a:r>
+              <a:rPr lang="pl-PL" sz="3000" dirty="0" smtClean="0">
+                <a:solidFill>
+                  <a:schemeClr val="accent6">
+                    <a:lumMod val="75000"/>
+                  </a:schemeClr>
+                </a:solidFill>
+              </a:rPr>
+              <a:t> – wskazuje na </a:t>
+            </a:r>
+            <a:r>
+              <a:rPr lang="pl-PL" sz="3000" dirty="0" smtClean="0">
+                <a:solidFill>
+                  <a:schemeClr val="accent6">
+                    <a:lumMod val="75000"/>
+                  </a:schemeClr>
+                </a:solidFill>
+              </a:rPr>
+              <a:t>asocjacje(lista</a:t>
+            </a:r>
+            <a:r>
+              <a:rPr lang="pl-PL" sz="3000" smtClean="0">
+                <a:solidFill>
+                  <a:schemeClr val="accent6">
+                    <a:lumMod val="75000"/>
+                  </a:schemeClr>
+                </a:solidFill>
+              </a:rPr>
+              <a:t>, obiekt), </a:t>
+            </a:r>
+            <a:r>
+              <a:rPr lang="pl-PL" sz="3000" dirty="0" smtClean="0">
+                <a:solidFill>
+                  <a:schemeClr val="accent6">
+                    <a:lumMod val="75000"/>
+                  </a:schemeClr>
+                </a:solidFill>
+              </a:rPr>
+              <a:t>która powinna zostać zaindeksowana (płaska struktura)</a:t>
+            </a:r>
+          </a:p>
+          <a:p>
+            <a:r>
+              <a:rPr lang="pl-PL" sz="3000" b="1" dirty="0" smtClean="0">
+                <a:solidFill>
+                  <a:schemeClr val="accent6">
+                    <a:lumMod val="75000"/>
+                  </a:schemeClr>
+                </a:solidFill>
+              </a:rPr>
+              <a:t>@</a:t>
+            </a:r>
+            <a:r>
+              <a:rPr lang="pl-PL" sz="3000" b="1" dirty="0" err="1" smtClean="0">
+                <a:solidFill>
+                  <a:schemeClr val="accent6">
+                    <a:lumMod val="75000"/>
+                  </a:schemeClr>
+                </a:solidFill>
+              </a:rPr>
+              <a:t>TikaBridge</a:t>
+            </a:r>
+            <a:r>
+              <a:rPr lang="pl-PL" sz="3000" dirty="0" smtClean="0">
+                <a:solidFill>
+                  <a:schemeClr val="accent6">
+                    <a:lumMod val="75000"/>
+                  </a:schemeClr>
+                </a:solidFill>
+              </a:rPr>
+              <a:t> – umożliwia integracje z modułami biblioteki Apache Tika (np. wybranie zawartości z pliku txt lub pdf)</a:t>
+            </a:r>
+          </a:p>
+          <a:p>
+            <a:endParaRPr lang="pl-PL" dirty="0"/>
+          </a:p>
+        </p:txBody>
+      </p:sp>
+    </p:spTree>
+    <p:extLst>
+      <p:ext uri="{BB962C8B-B14F-4D97-AF65-F5344CB8AC3E}">
+        <p14:creationId xmlns:p14="http://schemas.microsoft.com/office/powerpoint/2010/main" val="694450860"/>
+      </p:ext>
+    </p:extLst>
+  </p:cSld>
+  <p:clrMapOvr>
+    <a:masterClrMapping/>
+  </p:clrMapOvr>
+</p:sld>
+</file>
+
+<file path=ppt/slides/slide8.xml><?xml version="1.0" encoding="utf-8"?>
+<p:sld xmlns:a="http://schemas.openxmlformats.org/drawingml/2006/main" xmlns:r="http://schemas.openxmlformats.org/officeDocument/2006/relationships" xmlns:p="http://schemas.openxmlformats.org/presentationml/2006/main">
+  <p:cSld>
+    <p:spTree>
+      <p:nvGrpSpPr>
+        <p:cNvPr id="1" name=""/>
+        <p:cNvGrpSpPr/>
+        <p:nvPr/>
+      </p:nvGrpSpPr>
+      <p:grpSpPr>
+        <a:xfrm>
+          <a:off x="0" y="0"/>
+          <a:ext cx="0" cy="0"/>
+          <a:chOff x="0" y="0"/>
+          <a:chExt cx="0" cy="0"/>
+        </a:xfrm>
+      </p:grpSpPr>
+      <p:sp>
+        <p:nvSpPr>
+          <p:cNvPr id="2" name="Tytuł 1"/>
+          <p:cNvSpPr>
+            <a:spLocks noGrp="1"/>
+          </p:cNvSpPr>
+          <p:nvPr>
+            <p:ph type="title"/>
+          </p:nvPr>
+        </p:nvSpPr>
+        <p:spPr/>
+        <p:txBody>
+          <a:bodyPr/>
+          <a:lstStyle/>
+          <a:p>
+            <a:r>
+              <a:rPr lang="pl-PL" sz="6000" b="1" dirty="0" smtClean="0">
+                <a:solidFill>
+                  <a:schemeClr val="accent6">
+                    <a:lumMod val="75000"/>
+                  </a:schemeClr>
+                </a:solidFill>
+              </a:rPr>
               <a:t>Na podstawie…</a:t>
             </a:r>
             <a:endParaRPr lang="pl-PL" sz="6000" b="1" dirty="0">
@@ -4263,7 +4397,7 @@
 </p:sld>
 </file>
 
-<file path=ppt/slides/slide8.xml><?xml version="1.0" encoding="utf-8"?>
+<file path=ppt/slides/slide9.xml><?xml version="1.0" encoding="utf-8"?>
 <p:sld xmlns:a="http://schemas.openxmlformats.org/drawingml/2006/main" xmlns:r="http://schemas.openxmlformats.org/officeDocument/2006/relationships" xmlns:p="http://schemas.openxmlformats.org/presentationml/2006/main">
   <p:cSld>
     <p:spTree>

</xml_diff>